<commit_message>
change rl instruction name
</commit_message>
<xml_diff>
--- a/static/Tools/fMRIDirections.pptx
+++ b/static/Tools/fMRIDirections.pptx
@@ -14840,7 +14840,7 @@
             </a:pPr>
             <a:r>
               <a:rPr lang="en-US" dirty="0"/>
-              <a:t>Press the D key to start.</a:t>
+              <a:t>Press NEXT to start.</a:t>
             </a:r>
             <a:endParaRPr dirty="0"/>
           </a:p>
@@ -15627,7 +15627,7 @@
           </a:bodyPr>
           <a:lstStyle/>
           <a:p>
-            <a:pPr marL="0" marR="0" indent="0" algn="ctr" defTabSz="584200" rtl="1" fontAlgn="auto" latinLnBrk="0" hangingPunct="0">
+            <a:pPr marL="0" marR="0" indent="0" algn="ctr" defTabSz="584200" rtl="0" fontAlgn="auto" latinLnBrk="0" hangingPunct="0">
               <a:lnSpc>
                 <a:spcPct val="100000"/>
               </a:lnSpc>
@@ -15694,7 +15694,7 @@
             </a:pPr>
             <a:r>
               <a:rPr lang="en-US" sz="3500" dirty="0"/>
-              <a:t>When you are ready to start please press the D key.</a:t>
+              <a:t>When you are ready to start please press NEXT.</a:t>
             </a:r>
             <a:endParaRPr sz="3500" dirty="0"/>
           </a:p>
@@ -18330,7 +18330,7 @@
             </a:pPr>
             <a:r>
               <a:rPr lang="en-US" sz="3500" dirty="0"/>
-              <a:t>If you are too slow, you will see </a:t>
+              <a:t>If you are too slow to respond, you will see </a:t>
             </a:r>
           </a:p>
           <a:p>
@@ -18347,7 +18347,7 @@
             </a:r>
             <a:r>
               <a:rPr lang="en-US" sz="3500" i="1" dirty="0"/>
-              <a:t>Please respond more quickly</a:t>
+              <a:t>TOO SLOW</a:t>
             </a:r>
             <a:r>
               <a:rPr lang="en-US" sz="3500" dirty="0"/>
@@ -19591,7 +19591,7 @@
             </a:pPr>
             <a:r>
               <a:rPr lang="en-US" dirty="0"/>
-              <a:t>Press the D key to start.</a:t>
+              <a:t>Press NEXT to start.</a:t>
             </a:r>
             <a:endParaRPr dirty="0"/>
           </a:p>
@@ -22140,7 +22140,7 @@
             </a:pPr>
             <a:r>
               <a:rPr lang="en-US" sz="3500" dirty="0"/>
-              <a:t>If you are too slow, you will see </a:t>
+              <a:t>If you are too slow to respond, you will see </a:t>
             </a:r>
           </a:p>
           <a:p>
@@ -22157,7 +22157,7 @@
             </a:r>
             <a:r>
               <a:rPr lang="en-US" sz="3500" i="1" dirty="0"/>
-              <a:t>Please respond more quickly</a:t>
+              <a:t>TOO SLOW</a:t>
             </a:r>
             <a:r>
               <a:rPr lang="en-US" sz="3500" dirty="0"/>
@@ -22620,7 +22620,7 @@
             </a:pPr>
             <a:r>
               <a:rPr lang="en-US" dirty="0"/>
-              <a:t>Press the D key to start.</a:t>
+              <a:t>Press NEXT to start.</a:t>
             </a:r>
             <a:endParaRPr dirty="0"/>
           </a:p>

</xml_diff>

<commit_message>
change size to a single block
</commit_message>
<xml_diff>
--- a/static/Tools/fMRIDirections.pptx
+++ b/static/Tools/fMRIDirections.pptx
@@ -52,7 +52,7 @@
     <p:sldId id="312" r:id="rId43"/>
     <p:sldId id="314" r:id="rId44"/>
     <p:sldId id="316" r:id="rId45"/>
-    <p:sldId id="319" r:id="rId46"/>
+    <p:sldId id="346" r:id="rId46"/>
     <p:sldId id="321" r:id="rId47"/>
     <p:sldId id="322" r:id="rId48"/>
     <p:sldId id="323" r:id="rId49"/>
@@ -2443,7 +2443,7 @@
           </a:ln>
           <a:extLst>
             <a:ext uri="{C572A759-6A51-4108-AA02-DFA0A04FC94B}">
-              <ma14:wrappingTextBoxFlag xmlns:ma14="http://schemas.microsoft.com/office/mac/drawingml/2011/main" xmlns:a14="http://schemas.microsoft.com/office/drawing/2010/main" xmlns:m="http://schemas.openxmlformats.org/officeDocument/2006/math" xmlns="" val="1"/>
+              <ma14:wrappingTextBoxFlag xmlns="" xmlns:m="http://schemas.openxmlformats.org/officeDocument/2006/math" xmlns:a14="http://schemas.microsoft.com/office/drawing/2010/main" xmlns:ma14="http://schemas.microsoft.com/office/mac/drawingml/2011/main" val="1"/>
             </a:ext>
           </a:extLst>
         </p:spPr>
@@ -2482,7 +2482,7 @@
           </a:ln>
           <a:extLst>
             <a:ext uri="{C572A759-6A51-4108-AA02-DFA0A04FC94B}">
-              <ma14:wrappingTextBoxFlag xmlns:ma14="http://schemas.microsoft.com/office/mac/drawingml/2011/main" xmlns:a14="http://schemas.microsoft.com/office/drawing/2010/main" xmlns:m="http://schemas.openxmlformats.org/officeDocument/2006/math" xmlns="" val="1"/>
+              <ma14:wrappingTextBoxFlag xmlns="" xmlns:m="http://schemas.openxmlformats.org/officeDocument/2006/math" xmlns:a14="http://schemas.microsoft.com/office/drawing/2010/main" xmlns:ma14="http://schemas.microsoft.com/office/mac/drawingml/2011/main" val="1"/>
             </a:ext>
           </a:extLst>
         </p:spPr>
@@ -4841,7 +4841,7 @@
             <a:noFill/>
             <a:extLst>
               <a:ext uri="{909E8E84-426E-40dd-AFC4-6F175D3DCCD1}">
-                <a14:hiddenFill xmlns:a14="http://schemas.microsoft.com/office/drawing/2010/main" xmlns="">
+                <a14:hiddenFill xmlns="" xmlns:a14="http://schemas.microsoft.com/office/drawing/2010/main">
                   <a:solidFill>
                     <a:srgbClr val="FFFFFF"/>
                   </a:solidFill>
@@ -5123,7 +5123,7 @@
             <a:effectLst/>
             <a:extLst>
               <a:ext uri="{C572A759-6A51-4108-AA02-DFA0A04FC94B}">
-                <ma14:wrappingTextBoxFlag xmlns:ma14="http://schemas.microsoft.com/office/mac/drawingml/2011/main" xmlns:a14="http://schemas.microsoft.com/office/drawing/2010/main" xmlns:m="http://schemas.openxmlformats.org/officeDocument/2006/math" xmlns="" val="1"/>
+                <ma14:wrappingTextBoxFlag xmlns="" xmlns:m="http://schemas.openxmlformats.org/officeDocument/2006/math" xmlns:a14="http://schemas.microsoft.com/office/drawing/2010/main" xmlns:ma14="http://schemas.microsoft.com/office/mac/drawingml/2011/main" val="1"/>
               </a:ext>
             </a:extLst>
           </p:spPr>
@@ -5200,7 +5200,7 @@
             <a:effectLst/>
             <a:extLst>
               <a:ext uri="{C572A759-6A51-4108-AA02-DFA0A04FC94B}">
-                <ma14:wrappingTextBoxFlag xmlns:ma14="http://schemas.microsoft.com/office/mac/drawingml/2011/main" xmlns:a14="http://schemas.microsoft.com/office/drawing/2010/main" xmlns:m="http://schemas.openxmlformats.org/officeDocument/2006/math" xmlns="" val="1"/>
+                <ma14:wrappingTextBoxFlag xmlns="" xmlns:m="http://schemas.openxmlformats.org/officeDocument/2006/math" xmlns:a14="http://schemas.microsoft.com/office/drawing/2010/main" xmlns:ma14="http://schemas.microsoft.com/office/mac/drawingml/2011/main" val="1"/>
               </a:ext>
             </a:extLst>
           </p:spPr>
@@ -5668,7 +5668,7 @@
             </a:r>
             <a:r>
               <a:rPr lang="en-US" sz="3600" dirty="0"/>
-              <a:t>You can earn up to $2 each round.</a:t>
+              <a:t>You can earn up to $2 for the game.</a:t>
             </a:r>
           </a:p>
           <a:p>
@@ -5709,7 +5709,7 @@
         </p:nvGrpSpPr>
         <p:grpSpPr>
           <a:xfrm>
-            <a:off x="2751363" y="6162110"/>
+            <a:off x="2751363" y="6654480"/>
             <a:ext cx="3607728" cy="2743200"/>
             <a:chOff x="2147023" y="7093131"/>
             <a:chExt cx="2703146" cy="2055385"/>
@@ -5968,7 +5968,7 @@
             <a:noFill/>
             <a:extLst>
               <a:ext uri="{909E8E84-426E-40dd-AFC4-6F175D3DCCD1}">
-                <a14:hiddenFill xmlns:a14="http://schemas.microsoft.com/office/drawing/2010/main" xmlns="">
+                <a14:hiddenFill xmlns="" xmlns:a14="http://schemas.microsoft.com/office/drawing/2010/main">
                   <a:solidFill>
                     <a:srgbClr val="FFFFFF"/>
                   </a:solidFill>
@@ -5994,7 +5994,7 @@
         </p:nvCxnSpPr>
         <p:spPr>
           <a:xfrm>
-            <a:off x="6350563" y="7556961"/>
+            <a:off x="6350563" y="8031746"/>
             <a:ext cx="366119" cy="0"/>
           </a:xfrm>
           <a:prstGeom prst="straightConnector1">
@@ -6036,7 +6036,7 @@
         </p:nvSpPr>
         <p:spPr>
           <a:xfrm>
-            <a:off x="6946301" y="6162110"/>
+            <a:off x="6946301" y="6654480"/>
             <a:ext cx="3607728" cy="2743200"/>
           </a:xfrm>
           <a:prstGeom prst="rect">
@@ -6105,7 +6105,7 @@
         </p:nvSpPr>
         <p:spPr>
           <a:xfrm>
-            <a:off x="7994677" y="7151986"/>
+            <a:off x="7994677" y="7644356"/>
             <a:ext cx="1638130" cy="753080"/>
           </a:xfrm>
           <a:prstGeom prst="rect">
@@ -6318,8 +6318,8 @@
         </p:nvSpPr>
         <p:spPr>
           <a:xfrm>
-            <a:off x="1270000" y="2034768"/>
-            <a:ext cx="10464800" cy="6456004"/>
+            <a:off x="1270000" y="2901462"/>
+            <a:ext cx="10464800" cy="5589310"/>
           </a:xfrm>
           <a:prstGeom prst="rect">
             <a:avLst/>
@@ -6338,7 +6338,19 @@
             </a:pPr>
             <a:r>
               <a:rPr dirty="0"/>
-              <a:t>You will play 2 rounds of this game.</a:t>
+              <a:t>You will play </a:t>
+            </a:r>
+            <a:r>
+              <a:rPr lang="en-US" dirty="0"/>
+              <a:t>1</a:t>
+            </a:r>
+            <a:r>
+              <a:rPr dirty="0"/>
+              <a:t> round of this game</a:t>
+            </a:r>
+            <a:r>
+              <a:rPr lang="en-US" dirty="0"/>
+              <a:t>, </a:t>
             </a:r>
           </a:p>
           <a:p>
@@ -6349,50 +6361,13 @@
                 </a:solidFill>
               </a:defRPr>
             </a:pPr>
-            <a:endParaRPr dirty="0"/>
-          </a:p>
-          <a:p>
-            <a:pPr>
-              <a:defRPr sz="3500">
-                <a:solidFill>
-                  <a:srgbClr val="FFFFFF"/>
-                </a:solidFill>
-              </a:defRPr>
-            </a:pPr>
+            <a:r>
+              <a:rPr lang="en-US" dirty="0"/>
+              <a:t>for about 5 </a:t>
+            </a:r>
             <a:r>
               <a:rPr dirty="0"/>
-              <a:t>Each round will last about </a:t>
-            </a:r>
-            <a:r>
-              <a:rPr lang="he-IL" dirty="0"/>
-              <a:t>4</a:t>
-            </a:r>
-            <a:r>
-              <a:rPr dirty="0"/>
-              <a:t> minutes.</a:t>
-            </a:r>
-          </a:p>
-          <a:p>
-            <a:pPr>
-              <a:defRPr sz="3500">
-                <a:solidFill>
-                  <a:srgbClr val="FFFFFF"/>
-                </a:solidFill>
-              </a:defRPr>
-            </a:pPr>
-            <a:endParaRPr dirty="0"/>
-          </a:p>
-          <a:p>
-            <a:pPr>
-              <a:defRPr sz="3500">
-                <a:solidFill>
-                  <a:srgbClr val="FFFFFF"/>
-                </a:solidFill>
-              </a:defRPr>
-            </a:pPr>
-            <a:r>
-              <a:rPr dirty="0"/>
-              <a:t>We will check in with you after each round, and you can take a short break.</a:t>
+              <a:t>minutes.</a:t>
             </a:r>
           </a:p>
           <a:p>
@@ -9160,7 +9135,7 @@
             <a:effectLst/>
             <a:extLst>
               <a:ext uri="{C572A759-6A51-4108-AA02-DFA0A04FC94B}">
-                <ma14:wrappingTextBoxFlag xmlns:ma14="http://schemas.microsoft.com/office/mac/drawingml/2011/main" xmlns:a14="http://schemas.microsoft.com/office/drawing/2010/main" xmlns:m="http://schemas.openxmlformats.org/officeDocument/2006/math" xmlns="" val="1"/>
+                <ma14:wrappingTextBoxFlag xmlns="" xmlns:m="http://schemas.openxmlformats.org/officeDocument/2006/math" xmlns:a14="http://schemas.microsoft.com/office/drawing/2010/main" xmlns:ma14="http://schemas.microsoft.com/office/mac/drawingml/2011/main" val="1"/>
               </a:ext>
             </a:extLst>
           </p:spPr>
@@ -9237,7 +9212,7 @@
             <a:effectLst/>
             <a:extLst>
               <a:ext uri="{C572A759-6A51-4108-AA02-DFA0A04FC94B}">
-                <ma14:wrappingTextBoxFlag xmlns:ma14="http://schemas.microsoft.com/office/mac/drawingml/2011/main" xmlns:a14="http://schemas.microsoft.com/office/drawing/2010/main" xmlns:m="http://schemas.openxmlformats.org/officeDocument/2006/math" xmlns="" val="1"/>
+                <ma14:wrappingTextBoxFlag xmlns="" xmlns:m="http://schemas.openxmlformats.org/officeDocument/2006/math" xmlns:a14="http://schemas.microsoft.com/office/drawing/2010/main" xmlns:ma14="http://schemas.microsoft.com/office/mac/drawingml/2011/main" val="1"/>
               </a:ext>
             </a:extLst>
           </p:spPr>
@@ -9606,7 +9581,7 @@
             </a:r>
             <a:r>
               <a:rPr lang="en-US" dirty="0"/>
-              <a:t>1</a:t>
+              <a:t>2</a:t>
             </a:r>
             <a:r>
               <a:rPr dirty="0"/>
@@ -9633,7 +9608,7 @@
             </a:pPr>
             <a:r>
               <a:rPr lang="en-US" dirty="0"/>
-              <a:t>It will </a:t>
+              <a:t>Each will </a:t>
             </a:r>
             <a:r>
               <a:rPr dirty="0"/>
@@ -10318,7 +10293,7 @@
           </a:ln>
           <a:extLst>
             <a:ext uri="{C572A759-6A51-4108-AA02-DFA0A04FC94B}">
-              <ma14:wrappingTextBoxFlag xmlns:ma14="http://schemas.microsoft.com/office/mac/drawingml/2011/main" xmlns:a14="http://schemas.microsoft.com/office/drawing/2010/main" xmlns:m="http://schemas.openxmlformats.org/officeDocument/2006/math" xmlns="" val="1"/>
+              <ma14:wrappingTextBoxFlag xmlns="" xmlns:m="http://schemas.openxmlformats.org/officeDocument/2006/math" xmlns:a14="http://schemas.microsoft.com/office/drawing/2010/main" xmlns:ma14="http://schemas.microsoft.com/office/mac/drawingml/2011/main" val="1"/>
             </a:ext>
           </a:extLst>
         </p:spPr>
@@ -10687,7 +10662,7 @@
             <a:noFill/>
             <a:extLst>
               <a:ext uri="{909E8E84-426E-40dd-AFC4-6F175D3DCCD1}">
-                <a14:hiddenFill xmlns:a14="http://schemas.microsoft.com/office/drawing/2010/main" xmlns="">
+                <a14:hiddenFill xmlns="" xmlns:a14="http://schemas.microsoft.com/office/drawing/2010/main">
                   <a:solidFill>
                     <a:srgbClr val="FFFFFF"/>
                   </a:solidFill>
@@ -11286,7 +11261,7 @@
             </a:ln>
             <a:extLst>
               <a:ext uri="{C572A759-6A51-4108-AA02-DFA0A04FC94B}">
-                <ma14:wrappingTextBoxFlag xmlns:ma14="http://schemas.microsoft.com/office/mac/drawingml/2011/main" xmlns:a14="http://schemas.microsoft.com/office/drawing/2010/main" xmlns:m="http://schemas.openxmlformats.org/officeDocument/2006/math" xmlns="" val="1"/>
+                <ma14:wrappingTextBoxFlag xmlns="" xmlns:m="http://schemas.openxmlformats.org/officeDocument/2006/math" xmlns:a14="http://schemas.microsoft.com/office/drawing/2010/main" xmlns:ma14="http://schemas.microsoft.com/office/mac/drawingml/2011/main" val="1"/>
               </a:ext>
             </a:extLst>
           </p:spPr>
@@ -11655,7 +11630,7 @@
               <a:noFill/>
               <a:extLst>
                 <a:ext uri="{909E8E84-426E-40dd-AFC4-6F175D3DCCD1}">
-                  <a14:hiddenFill xmlns:a14="http://schemas.microsoft.com/office/drawing/2010/main" xmlns="">
+                  <a14:hiddenFill xmlns="" xmlns:a14="http://schemas.microsoft.com/office/drawing/2010/main">
                     <a:solidFill>
                       <a:srgbClr val="FFFFFF"/>
                     </a:solidFill>
@@ -12260,7 +12235,7 @@
             </a:ln>
             <a:extLst>
               <a:ext uri="{C572A759-6A51-4108-AA02-DFA0A04FC94B}">
-                <ma14:wrappingTextBoxFlag xmlns:ma14="http://schemas.microsoft.com/office/mac/drawingml/2011/main" xmlns:a14="http://schemas.microsoft.com/office/drawing/2010/main" xmlns:m="http://schemas.openxmlformats.org/officeDocument/2006/math" xmlns="" val="1"/>
+                <ma14:wrappingTextBoxFlag xmlns="" xmlns:m="http://schemas.openxmlformats.org/officeDocument/2006/math" xmlns:a14="http://schemas.microsoft.com/office/drawing/2010/main" xmlns:ma14="http://schemas.microsoft.com/office/mac/drawingml/2011/main" val="1"/>
               </a:ext>
             </a:extLst>
           </p:spPr>
@@ -12616,7 +12591,7 @@
               <a:noFill/>
               <a:extLst>
                 <a:ext uri="{909E8E84-426E-40dd-AFC4-6F175D3DCCD1}">
-                  <a14:hiddenFill xmlns:a14="http://schemas.microsoft.com/office/drawing/2010/main" xmlns="">
+                  <a14:hiddenFill xmlns="" xmlns:a14="http://schemas.microsoft.com/office/drawing/2010/main">
                     <a:solidFill>
                       <a:srgbClr val="FFFFFF"/>
                     </a:solidFill>
@@ -13782,7 +13757,7 @@
             <a:noFill/>
             <a:extLst>
               <a:ext uri="{909E8E84-426E-40dd-AFC4-6F175D3DCCD1}">
-                <a14:hiddenFill xmlns:a14="http://schemas.microsoft.com/office/drawing/2010/main" xmlns="">
+                <a14:hiddenFill xmlns="" xmlns:a14="http://schemas.microsoft.com/office/drawing/2010/main">
                   <a:solidFill>
                     <a:srgbClr val="FFFFFF"/>
                   </a:solidFill>
@@ -13943,7 +13918,7 @@
             </a:ln>
             <a:extLst>
               <a:ext uri="{C572A759-6A51-4108-AA02-DFA0A04FC94B}">
-                <ma14:wrappingTextBoxFlag xmlns:ma14="http://schemas.microsoft.com/office/mac/drawingml/2011/main" xmlns:a14="http://schemas.microsoft.com/office/drawing/2010/main" xmlns:m="http://schemas.openxmlformats.org/officeDocument/2006/math" xmlns="" val="1"/>
+                <ma14:wrappingTextBoxFlag xmlns="" xmlns:m="http://schemas.openxmlformats.org/officeDocument/2006/math" xmlns:a14="http://schemas.microsoft.com/office/drawing/2010/main" xmlns:ma14="http://schemas.microsoft.com/office/mac/drawingml/2011/main" val="1"/>
               </a:ext>
             </a:extLst>
           </p:spPr>
@@ -15870,7 +15845,7 @@
             </a:ln>
             <a:extLst>
               <a:ext uri="{C572A759-6A51-4108-AA02-DFA0A04FC94B}">
-                <ma14:wrappingTextBoxFlag xmlns:ma14="http://schemas.microsoft.com/office/mac/drawingml/2011/main" xmlns:a14="http://schemas.microsoft.com/office/drawing/2010/main" xmlns:m="http://schemas.openxmlformats.org/officeDocument/2006/math" xmlns="" val="1"/>
+                <ma14:wrappingTextBoxFlag xmlns="" xmlns:m="http://schemas.openxmlformats.org/officeDocument/2006/math" xmlns:a14="http://schemas.microsoft.com/office/drawing/2010/main" xmlns:ma14="http://schemas.microsoft.com/office/mac/drawingml/2011/main" val="1"/>
               </a:ext>
             </a:extLst>
           </p:spPr>
@@ -16226,7 +16201,7 @@
               <a:noFill/>
               <a:extLst>
                 <a:ext uri="{909E8E84-426E-40dd-AFC4-6F175D3DCCD1}">
-                  <a14:hiddenFill xmlns:a14="http://schemas.microsoft.com/office/drawing/2010/main" xmlns="">
+                  <a14:hiddenFill xmlns="" xmlns:a14="http://schemas.microsoft.com/office/drawing/2010/main">
                     <a:solidFill>
                       <a:srgbClr val="FFFFFF"/>
                     </a:solidFill>
@@ -17392,7 +17367,7 @@
             <a:noFill/>
             <a:extLst>
               <a:ext uri="{909E8E84-426E-40dd-AFC4-6F175D3DCCD1}">
-                <a14:hiddenFill xmlns:a14="http://schemas.microsoft.com/office/drawing/2010/main" xmlns="">
+                <a14:hiddenFill xmlns="" xmlns:a14="http://schemas.microsoft.com/office/drawing/2010/main">
                   <a:solidFill>
                     <a:srgbClr val="FFFFFF"/>
                   </a:solidFill>
@@ -18087,7 +18062,7 @@
             <a:noFill/>
             <a:extLst>
               <a:ext uri="{909E8E84-426E-40dd-AFC4-6F175D3DCCD1}">
-                <a14:hiddenFill xmlns:a14="http://schemas.microsoft.com/office/drawing/2010/main" xmlns="">
+                <a14:hiddenFill xmlns="" xmlns:a14="http://schemas.microsoft.com/office/drawing/2010/main">
                   <a:solidFill>
                     <a:srgbClr val="FFFFFF"/>
                   </a:solidFill>
@@ -18698,7 +18673,7 @@
             </a:r>
             <a:r>
               <a:rPr lang="en-US" sz="3600" dirty="0"/>
-              <a:t>You can earn up to 50¢ each round.</a:t>
+              <a:t>You can earn up to 50¢ this game.</a:t>
             </a:r>
           </a:p>
           <a:p>
@@ -18988,7 +18963,7 @@
             <a:noFill/>
             <a:extLst>
               <a:ext uri="{909E8E84-426E-40dd-AFC4-6F175D3DCCD1}">
-                <a14:hiddenFill xmlns:a14="http://schemas.microsoft.com/office/drawing/2010/main" xmlns="">
+                <a14:hiddenFill xmlns="" xmlns:a14="http://schemas.microsoft.com/office/drawing/2010/main">
                   <a:solidFill>
                     <a:srgbClr val="FFFFFF"/>
                   </a:solidFill>
@@ -19335,7 +19310,7 @@
         </p:nvSpPr>
         <p:spPr>
           <a:xfrm>
-            <a:off x="1270000" y="3141044"/>
+            <a:off x="1270000" y="3650998"/>
             <a:ext cx="10464800" cy="3471512"/>
           </a:xfrm>
           <a:prstGeom prst="rect">
@@ -19354,16 +19329,8 @@
               </a:defRPr>
             </a:pPr>
             <a:r>
-              <a:rPr dirty="0"/>
-              <a:t>You will play </a:t>
-            </a:r>
-            <a:r>
               <a:rPr lang="en-US" dirty="0"/>
-              <a:t>2</a:t>
-            </a:r>
-            <a:r>
-              <a:rPr dirty="0"/>
-              <a:t> rounds of this game.</a:t>
+              <a:t>You will play 1 round of this game.</a:t>
             </a:r>
           </a:p>
           <a:p>
@@ -19374,7 +19341,7 @@
                 </a:solidFill>
               </a:defRPr>
             </a:pPr>
-            <a:endParaRPr dirty="0"/>
+            <a:endParaRPr lang="en-US" dirty="0"/>
           </a:p>
           <a:p>
             <a:pPr>
@@ -19385,43 +19352,8 @@
               </a:defRPr>
             </a:pPr>
             <a:r>
-              <a:rPr dirty="0"/>
-              <a:t>Each round will last about </a:t>
-            </a:r>
-            <a:r>
               <a:rPr lang="en-US" dirty="0"/>
-              <a:t>4</a:t>
-            </a:r>
-            <a:r>
-              <a:rPr dirty="0"/>
-              <a:t> minutes.</a:t>
-            </a:r>
-          </a:p>
-          <a:p>
-            <a:pPr>
-              <a:defRPr sz="3500">
-                <a:solidFill>
-                  <a:srgbClr val="FFFFFF"/>
-                </a:solidFill>
-              </a:defRPr>
-            </a:pPr>
-            <a:endParaRPr dirty="0"/>
-          </a:p>
-          <a:p>
-            <a:pPr>
-              <a:defRPr sz="3500">
-                <a:solidFill>
-                  <a:srgbClr val="FFFFFF"/>
-                </a:solidFill>
-              </a:defRPr>
-            </a:pPr>
-            <a:r>
-              <a:rPr lang="en-US" dirty="0"/>
-              <a:t>After each round, you can take </a:t>
-            </a:r>
-            <a:r>
-              <a:rPr dirty="0"/>
-              <a:t>a short break.</a:t>
+              <a:t>It will last about 5 minutes.</a:t>
             </a:r>
           </a:p>
         </p:txBody>
@@ -19429,7 +19361,7 @@
     </p:spTree>
     <p:extLst>
       <p:ext uri="{BB962C8B-B14F-4D97-AF65-F5344CB8AC3E}">
-        <p14:creationId xmlns:p14="http://schemas.microsoft.com/office/powerpoint/2010/main" val="4272064360"/>
+        <p14:creationId xmlns:p14="http://schemas.microsoft.com/office/powerpoint/2010/main" val="2284072435"/>
       </p:ext>
     </p:extLst>
   </p:cSld>
@@ -20898,7 +20830,7 @@
           </a:ln>
           <a:extLst>
             <a:ext uri="{C572A759-6A51-4108-AA02-DFA0A04FC94B}">
-              <ma14:wrappingTextBoxFlag xmlns:ma14="http://schemas.microsoft.com/office/mac/drawingml/2011/main" xmlns:a14="http://schemas.microsoft.com/office/drawing/2010/main" xmlns:m="http://schemas.openxmlformats.org/officeDocument/2006/math" xmlns="" val="1"/>
+              <ma14:wrappingTextBoxFlag xmlns="" xmlns:m="http://schemas.openxmlformats.org/officeDocument/2006/math" xmlns:a14="http://schemas.microsoft.com/office/drawing/2010/main" xmlns:ma14="http://schemas.microsoft.com/office/mac/drawingml/2011/main" val="1"/>
             </a:ext>
           </a:extLst>
         </p:spPr>
@@ -22426,7 +22358,7 @@
         </p:nvSpPr>
         <p:spPr>
           <a:xfrm>
-            <a:off x="1270000" y="3141044"/>
+            <a:off x="1270000" y="3650998"/>
             <a:ext cx="10464800" cy="3471512"/>
           </a:xfrm>
           <a:prstGeom prst="rect">
@@ -22446,7 +22378,7 @@
             </a:pPr>
             <a:r>
               <a:rPr lang="en-US" dirty="0"/>
-              <a:t>You will play 1 rounds of this game.</a:t>
+              <a:t>You will play 2 rounds of this game.</a:t>
             </a:r>
           </a:p>
           <a:p>
@@ -22469,7 +22401,7 @@
             </a:pPr>
             <a:r>
               <a:rPr lang="en-US" dirty="0"/>
-              <a:t>It will last about 4 minutes.</a:t>
+              <a:t>Each will last about 4 minutes.</a:t>
             </a:r>
           </a:p>
         </p:txBody>
@@ -22750,7 +22682,7 @@
           </a:ln>
           <a:extLst>
             <a:ext uri="{C572A759-6A51-4108-AA02-DFA0A04FC94B}">
-              <ma14:wrappingTextBoxFlag xmlns:ma14="http://schemas.microsoft.com/office/mac/drawingml/2011/main" xmlns:a14="http://schemas.microsoft.com/office/drawing/2010/main" xmlns:m="http://schemas.openxmlformats.org/officeDocument/2006/math" xmlns="" val="1"/>
+              <ma14:wrappingTextBoxFlag xmlns="" xmlns:m="http://schemas.openxmlformats.org/officeDocument/2006/math" xmlns:a14="http://schemas.microsoft.com/office/drawing/2010/main" xmlns:ma14="http://schemas.microsoft.com/office/mac/drawingml/2011/main" val="1"/>
             </a:ext>
           </a:extLst>
         </p:spPr>
@@ -22827,7 +22759,7 @@
           </a:ln>
           <a:extLst>
             <a:ext uri="{C572A759-6A51-4108-AA02-DFA0A04FC94B}">
-              <ma14:wrappingTextBoxFlag xmlns:ma14="http://schemas.microsoft.com/office/mac/drawingml/2011/main" xmlns:a14="http://schemas.microsoft.com/office/drawing/2010/main" xmlns:m="http://schemas.openxmlformats.org/officeDocument/2006/math" xmlns="" val="1"/>
+              <ma14:wrappingTextBoxFlag xmlns="" xmlns:m="http://schemas.openxmlformats.org/officeDocument/2006/math" xmlns:a14="http://schemas.microsoft.com/office/drawing/2010/main" xmlns:ma14="http://schemas.microsoft.com/office/mac/drawingml/2011/main" val="1"/>
             </a:ext>
           </a:extLst>
         </p:spPr>
@@ -22921,7 +22853,7 @@
           </a:ln>
           <a:extLst>
             <a:ext uri="{C572A759-6A51-4108-AA02-DFA0A04FC94B}">
-              <ma14:wrappingTextBoxFlag xmlns:ma14="http://schemas.microsoft.com/office/mac/drawingml/2011/main" xmlns:a14="http://schemas.microsoft.com/office/drawing/2010/main" xmlns:m="http://schemas.openxmlformats.org/officeDocument/2006/math" xmlns="" val="1"/>
+              <ma14:wrappingTextBoxFlag xmlns="" xmlns:m="http://schemas.openxmlformats.org/officeDocument/2006/math" xmlns:a14="http://schemas.microsoft.com/office/drawing/2010/main" xmlns:ma14="http://schemas.microsoft.com/office/mac/drawingml/2011/main" val="1"/>
             </a:ext>
           </a:extLst>
         </p:spPr>
@@ -23289,7 +23221,7 @@
           <a:effectLst/>
           <a:extLst>
             <a:ext uri="{C572A759-6A51-4108-AA02-DFA0A04FC94B}">
-              <ma14:wrappingTextBoxFlag xmlns:ma14="http://schemas.microsoft.com/office/mac/drawingml/2011/main" xmlns:a14="http://schemas.microsoft.com/office/drawing/2010/main" xmlns:m="http://schemas.openxmlformats.org/officeDocument/2006/math" xmlns="" val="1"/>
+              <ma14:wrappingTextBoxFlag xmlns="" xmlns:m="http://schemas.openxmlformats.org/officeDocument/2006/math" xmlns:a14="http://schemas.microsoft.com/office/drawing/2010/main" xmlns:ma14="http://schemas.microsoft.com/office/mac/drawingml/2011/main" val="1"/>
             </a:ext>
           </a:extLst>
         </p:spPr>
@@ -23336,7 +23268,7 @@
           <a:effectLst/>
           <a:extLst>
             <a:ext uri="{C572A759-6A51-4108-AA02-DFA0A04FC94B}">
-              <ma14:wrappingTextBoxFlag xmlns:ma14="http://schemas.microsoft.com/office/mac/drawingml/2011/main" xmlns:a14="http://schemas.microsoft.com/office/drawing/2010/main" xmlns:m="http://schemas.openxmlformats.org/officeDocument/2006/math" xmlns="" val="1"/>
+              <ma14:wrappingTextBoxFlag xmlns="" xmlns:m="http://schemas.openxmlformats.org/officeDocument/2006/math" xmlns:a14="http://schemas.microsoft.com/office/drawing/2010/main" xmlns:ma14="http://schemas.microsoft.com/office/mac/drawingml/2011/main" val="1"/>
             </a:ext>
           </a:extLst>
         </p:spPr>

</xml_diff>